<commit_message>
First draft of R markdown chapter
</commit_message>
<xml_diff>
--- a/img/02_part_coding_tools_and_best_practices/03_r_markdown/r_markdown.pptx
+++ b/img/02_part_coding_tools_and_best_practices/03_r_markdown/r_markdown.pptx
@@ -5,16 +5,18 @@
     <p:sldMasterId id="2147483648" r:id="rId1"/>
   </p:sldMasterIdLst>
   <p:notesMasterIdLst>
-    <p:notesMasterId r:id="rId9"/>
+    <p:notesMasterId r:id="rId11"/>
   </p:notesMasterIdLst>
   <p:sldIdLst>
-    <p:sldId id="263" r:id="rId2"/>
-    <p:sldId id="278" r:id="rId3"/>
-    <p:sldId id="279" r:id="rId4"/>
-    <p:sldId id="280" r:id="rId5"/>
-    <p:sldId id="270" r:id="rId6"/>
-    <p:sldId id="271" r:id="rId7"/>
-    <p:sldId id="272" r:id="rId8"/>
+    <p:sldId id="277" r:id="rId2"/>
+    <p:sldId id="279" r:id="rId3"/>
+    <p:sldId id="278" r:id="rId4"/>
+    <p:sldId id="270" r:id="rId5"/>
+    <p:sldId id="271" r:id="rId6"/>
+    <p:sldId id="272" r:id="rId7"/>
+    <p:sldId id="276" r:id="rId8"/>
+    <p:sldId id="275" r:id="rId9"/>
+    <p:sldId id="273" r:id="rId10"/>
   </p:sldIdLst>
   <p:sldSz cx="12192000" cy="6858000"/>
   <p:notesSz cx="6858000" cy="9144000"/>
@@ -203,7 +205,7 @@
           <a:p>
             <a:fld id="{69063D2C-CD33-7D4C-A7A9-3D183FCC894C}" type="datetimeFigureOut">
               <a:rPr lang="en-US" smtClean="0"/>
-              <a:t>5/20/20</a:t>
+              <a:t>5/25/20</a:t>
             </a:fld>
             <a:endParaRPr lang="en-US"/>
           </a:p>
@@ -516,7 +518,7 @@
           <a:p>
             <a:r>
               <a:rPr lang="en-US" dirty="0" err="1"/>
-              <a:t>using_console</a:t>
+              <a:t>example_r_markdown</a:t>
             </a:r>
             <a:endParaRPr lang="en-US" dirty="0"/>
           </a:p>
@@ -548,7 +550,7 @@
     </p:spTree>
     <p:extLst>
       <p:ext uri="{BB962C8B-B14F-4D97-AF65-F5344CB8AC3E}">
-        <p14:creationId xmlns:p14="http://schemas.microsoft.com/office/powerpoint/2010/main" val="3723974367"/>
+        <p14:creationId xmlns:p14="http://schemas.microsoft.com/office/powerpoint/2010/main" val="3611309067"/>
       </p:ext>
     </p:extLst>
   </p:cSld>
@@ -603,9 +605,10 @@
           <a:lstStyle/>
           <a:p>
             <a:r>
-              <a:rPr lang="en-US" dirty="0"/>
-              <a:t>history</a:t>
-            </a:r>
+              <a:rPr lang="en-US" dirty="0" err="1"/>
+              <a:t>rendered_preview</a:t>
+            </a:r>
+            <a:endParaRPr lang="en-US" dirty="0"/>
           </a:p>
         </p:txBody>
       </p:sp>
@@ -635,7 +638,7 @@
     </p:spTree>
     <p:extLst>
       <p:ext uri="{BB962C8B-B14F-4D97-AF65-F5344CB8AC3E}">
-        <p14:creationId xmlns:p14="http://schemas.microsoft.com/office/powerpoint/2010/main" val="1636901529"/>
+        <p14:creationId xmlns:p14="http://schemas.microsoft.com/office/powerpoint/2010/main" val="3231824507"/>
       </p:ext>
     </p:extLst>
   </p:cSld>
@@ -691,7 +694,7 @@
           <a:p>
             <a:r>
               <a:rPr lang="en-US" dirty="0" err="1"/>
-              <a:t>example_script</a:t>
+              <a:t>markdown_files</a:t>
             </a:r>
             <a:endParaRPr lang="en-US" dirty="0"/>
           </a:p>
@@ -723,7 +726,7 @@
     </p:spTree>
     <p:extLst>
       <p:ext uri="{BB962C8B-B14F-4D97-AF65-F5344CB8AC3E}">
-        <p14:creationId xmlns:p14="http://schemas.microsoft.com/office/powerpoint/2010/main" val="2231654508"/>
+        <p14:creationId xmlns:p14="http://schemas.microsoft.com/office/powerpoint/2010/main" val="150199200"/>
       </p:ext>
     </p:extLst>
   </p:cSld>
@@ -779,7 +782,7 @@
           <a:p>
             <a:r>
               <a:rPr lang="en-US" dirty="0"/>
-              <a:t>counter</a:t>
+              <a:t>new_r_markdown1</a:t>
             </a:r>
           </a:p>
         </p:txBody>
@@ -810,7 +813,7 @@
     </p:spTree>
     <p:extLst>
       <p:ext uri="{BB962C8B-B14F-4D97-AF65-F5344CB8AC3E}">
-        <p14:creationId xmlns:p14="http://schemas.microsoft.com/office/powerpoint/2010/main" val="622514317"/>
+        <p14:creationId xmlns:p14="http://schemas.microsoft.com/office/powerpoint/2010/main" val="1060737405"/>
       </p:ext>
     </p:extLst>
   </p:cSld>
@@ -866,7 +869,7 @@
           <a:p>
             <a:r>
               <a:rPr lang="en-US" dirty="0"/>
-              <a:t>new_r_script1</a:t>
+              <a:t>new_r_markdown2</a:t>
             </a:r>
           </a:p>
         </p:txBody>
@@ -897,7 +900,7 @@
     </p:spTree>
     <p:extLst>
       <p:ext uri="{BB962C8B-B14F-4D97-AF65-F5344CB8AC3E}">
-        <p14:creationId xmlns:p14="http://schemas.microsoft.com/office/powerpoint/2010/main" val="1060737405"/>
+        <p14:creationId xmlns:p14="http://schemas.microsoft.com/office/powerpoint/2010/main" val="2027136237"/>
       </p:ext>
     </p:extLst>
   </p:cSld>
@@ -953,7 +956,7 @@
           <a:p>
             <a:r>
               <a:rPr lang="en-US" dirty="0"/>
-              <a:t>new_r_script2</a:t>
+              <a:t>new_r_markdown3</a:t>
             </a:r>
           </a:p>
         </p:txBody>
@@ -984,7 +987,7 @@
     </p:spTree>
     <p:extLst>
       <p:ext uri="{BB962C8B-B14F-4D97-AF65-F5344CB8AC3E}">
-        <p14:creationId xmlns:p14="http://schemas.microsoft.com/office/powerpoint/2010/main" val="2027136237"/>
+        <p14:creationId xmlns:p14="http://schemas.microsoft.com/office/powerpoint/2010/main" val="3619338528"/>
       </p:ext>
     </p:extLst>
   </p:cSld>
@@ -1039,10 +1042,9 @@
           <a:lstStyle/>
           <a:p>
             <a:r>
-              <a:rPr lang="en-US"/>
-              <a:t>new_r_script3</a:t>
-            </a:r>
-            <a:endParaRPr lang="en-US" dirty="0"/>
+              <a:rPr lang="en-US" dirty="0"/>
+              <a:t>preview</a:t>
+            </a:r>
           </a:p>
         </p:txBody>
       </p:sp>
@@ -1072,7 +1074,183 @@
     </p:spTree>
     <p:extLst>
       <p:ext uri="{BB962C8B-B14F-4D97-AF65-F5344CB8AC3E}">
-        <p14:creationId xmlns:p14="http://schemas.microsoft.com/office/powerpoint/2010/main" val="3619338528"/>
+        <p14:creationId xmlns:p14="http://schemas.microsoft.com/office/powerpoint/2010/main" val="1756032396"/>
+      </p:ext>
+    </p:extLst>
+  </p:cSld>
+  <p:clrMapOvr>
+    <a:masterClrMapping/>
+  </p:clrMapOvr>
+</p:notes>
+</file>
+
+<file path=ppt/notesSlides/notesSlide8.xml><?xml version="1.0" encoding="utf-8"?>
+<p:notes xmlns:a="http://schemas.openxmlformats.org/drawingml/2006/main" xmlns:r="http://schemas.openxmlformats.org/officeDocument/2006/relationships" xmlns:p="http://schemas.openxmlformats.org/presentationml/2006/main">
+  <p:cSld>
+    <p:spTree>
+      <p:nvGrpSpPr>
+        <p:cNvPr id="1" name=""/>
+        <p:cNvGrpSpPr/>
+        <p:nvPr/>
+      </p:nvGrpSpPr>
+      <p:grpSpPr>
+        <a:xfrm>
+          <a:off x="0" y="0"/>
+          <a:ext cx="0" cy="0"/>
+          <a:chOff x="0" y="0"/>
+          <a:chExt cx="0" cy="0"/>
+        </a:xfrm>
+      </p:grpSpPr>
+      <p:sp>
+        <p:nvSpPr>
+          <p:cNvPr id="2" name="Slide Image Placeholder 1"/>
+          <p:cNvSpPr>
+            <a:spLocks noGrp="1" noRot="1" noChangeAspect="1"/>
+          </p:cNvSpPr>
+          <p:nvPr>
+            <p:ph type="sldImg"/>
+          </p:nvPr>
+        </p:nvSpPr>
+        <p:spPr/>
+      </p:sp>
+      <p:sp>
+        <p:nvSpPr>
+          <p:cNvPr id="3" name="Notes Placeholder 2"/>
+          <p:cNvSpPr>
+            <a:spLocks noGrp="1"/>
+          </p:cNvSpPr>
+          <p:nvPr>
+            <p:ph type="body" idx="1"/>
+          </p:nvPr>
+        </p:nvSpPr>
+        <p:spPr/>
+        <p:txBody>
+          <a:bodyPr/>
+          <a:lstStyle/>
+          <a:p>
+            <a:r>
+              <a:rPr lang="en-US" dirty="0" err="1"/>
+              <a:t>rendered_r_notebook</a:t>
+            </a:r>
+            <a:endParaRPr lang="en-US" dirty="0"/>
+          </a:p>
+        </p:txBody>
+      </p:sp>
+      <p:sp>
+        <p:nvSpPr>
+          <p:cNvPr id="4" name="Slide Number Placeholder 3"/>
+          <p:cNvSpPr>
+            <a:spLocks noGrp="1"/>
+          </p:cNvSpPr>
+          <p:nvPr>
+            <p:ph type="sldNum" sz="quarter" idx="5"/>
+          </p:nvPr>
+        </p:nvSpPr>
+        <p:spPr/>
+        <p:txBody>
+          <a:bodyPr/>
+          <a:lstStyle/>
+          <a:p>
+            <a:fld id="{08247185-3971-9549-98BD-EC011166E1B0}" type="slidenum">
+              <a:rPr lang="en-US" smtClean="0"/>
+              <a:t>8</a:t>
+            </a:fld>
+            <a:endParaRPr lang="en-US"/>
+          </a:p>
+        </p:txBody>
+      </p:sp>
+    </p:spTree>
+    <p:extLst>
+      <p:ext uri="{BB962C8B-B14F-4D97-AF65-F5344CB8AC3E}">
+        <p14:creationId xmlns:p14="http://schemas.microsoft.com/office/powerpoint/2010/main" val="3300092367"/>
+      </p:ext>
+    </p:extLst>
+  </p:cSld>
+  <p:clrMapOvr>
+    <a:masterClrMapping/>
+  </p:clrMapOvr>
+</p:notes>
+</file>
+
+<file path=ppt/notesSlides/notesSlide9.xml><?xml version="1.0" encoding="utf-8"?>
+<p:notes xmlns:a="http://schemas.openxmlformats.org/drawingml/2006/main" xmlns:r="http://schemas.openxmlformats.org/officeDocument/2006/relationships" xmlns:p="http://schemas.openxmlformats.org/presentationml/2006/main">
+  <p:cSld>
+    <p:spTree>
+      <p:nvGrpSpPr>
+        <p:cNvPr id="1" name=""/>
+        <p:cNvGrpSpPr/>
+        <p:nvPr/>
+      </p:nvGrpSpPr>
+      <p:grpSpPr>
+        <a:xfrm>
+          <a:off x="0" y="0"/>
+          <a:ext cx="0" cy="0"/>
+          <a:chOff x="0" y="0"/>
+          <a:chExt cx="0" cy="0"/>
+        </a:xfrm>
+      </p:grpSpPr>
+      <p:sp>
+        <p:nvSpPr>
+          <p:cNvPr id="2" name="Slide Image Placeholder 1"/>
+          <p:cNvSpPr>
+            <a:spLocks noGrp="1" noRot="1" noChangeAspect="1"/>
+          </p:cNvSpPr>
+          <p:nvPr>
+            <p:ph type="sldImg"/>
+          </p:nvPr>
+        </p:nvSpPr>
+        <p:spPr/>
+      </p:sp>
+      <p:sp>
+        <p:nvSpPr>
+          <p:cNvPr id="3" name="Notes Placeholder 2"/>
+          <p:cNvSpPr>
+            <a:spLocks noGrp="1"/>
+          </p:cNvSpPr>
+          <p:nvPr>
+            <p:ph type="body" idx="1"/>
+          </p:nvPr>
+        </p:nvSpPr>
+        <p:spPr/>
+        <p:txBody>
+          <a:bodyPr/>
+          <a:lstStyle/>
+          <a:p>
+            <a:r>
+              <a:rPr lang="en-US" dirty="0" err="1"/>
+              <a:t>code_chunk_output</a:t>
+            </a:r>
+            <a:endParaRPr lang="en-US" dirty="0"/>
+          </a:p>
+        </p:txBody>
+      </p:sp>
+      <p:sp>
+        <p:nvSpPr>
+          <p:cNvPr id="4" name="Slide Number Placeholder 3"/>
+          <p:cNvSpPr>
+            <a:spLocks noGrp="1"/>
+          </p:cNvSpPr>
+          <p:nvPr>
+            <p:ph type="sldNum" sz="quarter" idx="5"/>
+          </p:nvPr>
+        </p:nvSpPr>
+        <p:spPr/>
+        <p:txBody>
+          <a:bodyPr/>
+          <a:lstStyle/>
+          <a:p>
+            <a:fld id="{08247185-3971-9549-98BD-EC011166E1B0}" type="slidenum">
+              <a:rPr lang="en-US" smtClean="0"/>
+              <a:t>9</a:t>
+            </a:fld>
+            <a:endParaRPr lang="en-US"/>
+          </a:p>
+        </p:txBody>
+      </p:sp>
+    </p:spTree>
+    <p:extLst>
+      <p:ext uri="{BB962C8B-B14F-4D97-AF65-F5344CB8AC3E}">
+        <p14:creationId xmlns:p14="http://schemas.microsoft.com/office/powerpoint/2010/main" val="654177206"/>
       </p:ext>
     </p:extLst>
   </p:cSld>
@@ -1211,7 +1389,7 @@
           <a:p>
             <a:fld id="{61246A8F-4FAD-404E-8377-32132B9F7FEC}" type="datetimeFigureOut">
               <a:rPr lang="en-US" smtClean="0"/>
-              <a:t>5/20/20</a:t>
+              <a:t>5/25/20</a:t>
             </a:fld>
             <a:endParaRPr lang="en-US"/>
           </a:p>
@@ -1379,7 +1557,7 @@
           <a:p>
             <a:fld id="{61246A8F-4FAD-404E-8377-32132B9F7FEC}" type="datetimeFigureOut">
               <a:rPr lang="en-US" smtClean="0"/>
-              <a:t>5/20/20</a:t>
+              <a:t>5/25/20</a:t>
             </a:fld>
             <a:endParaRPr lang="en-US"/>
           </a:p>
@@ -1557,7 +1735,7 @@
           <a:p>
             <a:fld id="{61246A8F-4FAD-404E-8377-32132B9F7FEC}" type="datetimeFigureOut">
               <a:rPr lang="en-US" smtClean="0"/>
-              <a:t>5/20/20</a:t>
+              <a:t>5/25/20</a:t>
             </a:fld>
             <a:endParaRPr lang="en-US"/>
           </a:p>
@@ -1725,7 +1903,7 @@
           <a:p>
             <a:fld id="{61246A8F-4FAD-404E-8377-32132B9F7FEC}" type="datetimeFigureOut">
               <a:rPr lang="en-US" smtClean="0"/>
-              <a:t>5/20/20</a:t>
+              <a:t>5/25/20</a:t>
             </a:fld>
             <a:endParaRPr lang="en-US"/>
           </a:p>
@@ -1970,7 +2148,7 @@
           <a:p>
             <a:fld id="{61246A8F-4FAD-404E-8377-32132B9F7FEC}" type="datetimeFigureOut">
               <a:rPr lang="en-US" smtClean="0"/>
-              <a:t>5/20/20</a:t>
+              <a:t>5/25/20</a:t>
             </a:fld>
             <a:endParaRPr lang="en-US"/>
           </a:p>
@@ -2199,7 +2377,7 @@
           <a:p>
             <a:fld id="{61246A8F-4FAD-404E-8377-32132B9F7FEC}" type="datetimeFigureOut">
               <a:rPr lang="en-US" smtClean="0"/>
-              <a:t>5/20/20</a:t>
+              <a:t>5/25/20</a:t>
             </a:fld>
             <a:endParaRPr lang="en-US"/>
           </a:p>
@@ -2563,7 +2741,7 @@
           <a:p>
             <a:fld id="{61246A8F-4FAD-404E-8377-32132B9F7FEC}" type="datetimeFigureOut">
               <a:rPr lang="en-US" smtClean="0"/>
-              <a:t>5/20/20</a:t>
+              <a:t>5/25/20</a:t>
             </a:fld>
             <a:endParaRPr lang="en-US"/>
           </a:p>
@@ -2680,7 +2858,7 @@
           <a:p>
             <a:fld id="{61246A8F-4FAD-404E-8377-32132B9F7FEC}" type="datetimeFigureOut">
               <a:rPr lang="en-US" smtClean="0"/>
-              <a:t>5/20/20</a:t>
+              <a:t>5/25/20</a:t>
             </a:fld>
             <a:endParaRPr lang="en-US"/>
           </a:p>
@@ -2775,7 +2953,7 @@
           <a:p>
             <a:fld id="{61246A8F-4FAD-404E-8377-32132B9F7FEC}" type="datetimeFigureOut">
               <a:rPr lang="en-US" smtClean="0"/>
-              <a:t>5/20/20</a:t>
+              <a:t>5/25/20</a:t>
             </a:fld>
             <a:endParaRPr lang="en-US"/>
           </a:p>
@@ -3050,7 +3228,7 @@
           <a:p>
             <a:fld id="{61246A8F-4FAD-404E-8377-32132B9F7FEC}" type="datetimeFigureOut">
               <a:rPr lang="en-US" smtClean="0"/>
-              <a:t>5/20/20</a:t>
+              <a:t>5/25/20</a:t>
             </a:fld>
             <a:endParaRPr lang="en-US"/>
           </a:p>
@@ -3302,7 +3480,7 @@
           <a:p>
             <a:fld id="{61246A8F-4FAD-404E-8377-32132B9F7FEC}" type="datetimeFigureOut">
               <a:rPr lang="en-US" smtClean="0"/>
-              <a:t>5/20/20</a:t>
+              <a:t>5/25/20</a:t>
             </a:fld>
             <a:endParaRPr lang="en-US"/>
           </a:p>
@@ -3513,7 +3691,7 @@
           <a:p>
             <a:fld id="{61246A8F-4FAD-404E-8377-32132B9F7FEC}" type="datetimeFigureOut">
               <a:rPr lang="en-US" smtClean="0"/>
-              <a:t>5/20/20</a:t>
+              <a:t>5/25/20</a:t>
             </a:fld>
             <a:endParaRPr lang="en-US"/>
           </a:p>
@@ -3904,14 +4082,6 @@
 <file path=ppt/slides/slide1.xml><?xml version="1.0" encoding="utf-8"?>
 <p:sld xmlns:a="http://schemas.openxmlformats.org/drawingml/2006/main" xmlns:r="http://schemas.openxmlformats.org/officeDocument/2006/relationships" xmlns:p="http://schemas.openxmlformats.org/presentationml/2006/main">
   <p:cSld>
-    <p:bg>
-      <p:bgPr>
-        <a:solidFill>
-          <a:schemeClr val="bg1"/>
-        </a:solidFill>
-        <a:effectLst/>
-      </p:bgPr>
-    </p:bg>
     <p:spTree>
       <p:nvGrpSpPr>
         <p:cNvPr id="1" name=""/>
@@ -3928,10 +4098,10 @@
       </p:grpSpPr>
       <p:pic>
         <p:nvPicPr>
-          <p:cNvPr id="8" name="Picture 7" descr="A screenshot of a social media post&#10;&#10;Description automatically generated">
+          <p:cNvPr id="3" name="Picture 2" descr="A screenshot of a computer&#10;&#10;Description automatically generated">
             <a:extLst>
               <a:ext uri="{FF2B5EF4-FFF2-40B4-BE49-F238E27FC236}">
-                <a16:creationId xmlns:a16="http://schemas.microsoft.com/office/drawing/2014/main" id="{BDCBF4FD-1194-A448-93F7-3A6087C7BB43}"/>
+                <a16:creationId xmlns:a16="http://schemas.microsoft.com/office/drawing/2014/main" id="{EDFC8782-6865-774D-AA50-1E654938095B}"/>
               </a:ext>
             </a:extLst>
           </p:cNvPr>
@@ -3940,77 +4110,26 @@
           </p:cNvPicPr>
           <p:nvPr/>
         </p:nvPicPr>
-        <p:blipFill rotWithShape="1">
+        <p:blipFill>
           <a:blip r:embed="rId3"/>
-          <a:srcRect t="1119" b="1479"/>
-          <a:stretch/>
+          <a:stretch>
+            <a:fillRect/>
+          </a:stretch>
         </p:blipFill>
         <p:spPr>
           <a:xfrm>
-            <a:off x="20" y="10"/>
-            <a:ext cx="12191980" cy="6857990"/>
+            <a:off x="3236656" y="0"/>
+            <a:ext cx="5718687" cy="6858000"/>
           </a:xfrm>
           <a:prstGeom prst="rect">
             <a:avLst/>
           </a:prstGeom>
         </p:spPr>
       </p:pic>
-      <p:sp>
-        <p:nvSpPr>
-          <p:cNvPr id="9" name="Rectangle 8">
-            <a:extLst>
-              <a:ext uri="{FF2B5EF4-FFF2-40B4-BE49-F238E27FC236}">
-                <a16:creationId xmlns:a16="http://schemas.microsoft.com/office/drawing/2014/main" id="{364B421E-92C0-0A49-9EBC-CDAE93823D3F}"/>
-              </a:ext>
-            </a:extLst>
-          </p:cNvPr>
-          <p:cNvSpPr/>
-          <p:nvPr/>
-        </p:nvSpPr>
-        <p:spPr>
-          <a:xfrm>
-            <a:off x="123568" y="5684109"/>
-            <a:ext cx="11973697" cy="1013254"/>
-          </a:xfrm>
-          <a:prstGeom prst="rect">
-            <a:avLst/>
-          </a:prstGeom>
-          <a:noFill/>
-          <a:ln w="38100">
-            <a:solidFill>
-              <a:srgbClr val="C00000"/>
-            </a:solidFill>
-          </a:ln>
-        </p:spPr>
-        <p:style>
-          <a:lnRef idx="2">
-            <a:schemeClr val="accent1">
-              <a:shade val="50000"/>
-            </a:schemeClr>
-          </a:lnRef>
-          <a:fillRef idx="1">
-            <a:schemeClr val="accent1"/>
-          </a:fillRef>
-          <a:effectRef idx="0">
-            <a:schemeClr val="accent1"/>
-          </a:effectRef>
-          <a:fontRef idx="minor">
-            <a:schemeClr val="lt1"/>
-          </a:fontRef>
-        </p:style>
-        <p:txBody>
-          <a:bodyPr rtlCol="0" anchor="ctr"/>
-          <a:lstStyle/>
-          <a:p>
-            <a:pPr algn="ctr"/>
-            <a:endParaRPr lang="en-US"/>
-          </a:p>
-        </p:txBody>
-      </p:sp>
     </p:spTree>
     <p:extLst>
       <p:ext uri="{BB962C8B-B14F-4D97-AF65-F5344CB8AC3E}">
-        <p14:creationId xmlns:p14="http://schemas.microsoft.com/office/powerpoint/2010/main" val="4189744167"/>
+        <p14:creationId xmlns:p14="http://schemas.microsoft.com/office/powerpoint/2010/main" val="1644447153"/>
       </p:ext>
     </p:extLst>
   </p:cSld>
@@ -4039,10 +4158,10 @@
       </p:grpSpPr>
       <p:pic>
         <p:nvPicPr>
-          <p:cNvPr id="5" name="Picture 4" descr="A screenshot of a computer&#10;&#10;Description automatically generated">
+          <p:cNvPr id="3" name="Picture 2" descr="A screenshot of a social media post&#10;&#10;Description automatically generated">
             <a:extLst>
               <a:ext uri="{FF2B5EF4-FFF2-40B4-BE49-F238E27FC236}">
-                <a16:creationId xmlns:a16="http://schemas.microsoft.com/office/drawing/2014/main" id="{B4621B04-71FC-164B-9D15-6797999198EF}"/>
+                <a16:creationId xmlns:a16="http://schemas.microsoft.com/office/drawing/2014/main" id="{2671F7AB-950A-5F42-97AB-13AB32831B3C}"/>
               </a:ext>
             </a:extLst>
           </p:cNvPr>
@@ -4059,166 +4178,18 @@
         </p:blipFill>
         <p:spPr>
           <a:xfrm>
-            <a:off x="0" y="965517"/>
-            <a:ext cx="12192000" cy="4926965"/>
+            <a:off x="2104535" y="0"/>
+            <a:ext cx="7982929" cy="6858000"/>
           </a:xfrm>
           <a:prstGeom prst="rect">
             <a:avLst/>
           </a:prstGeom>
         </p:spPr>
       </p:pic>
-      <p:sp>
-        <p:nvSpPr>
-          <p:cNvPr id="6" name="Rectangle 5">
-            <a:extLst>
-              <a:ext uri="{FF2B5EF4-FFF2-40B4-BE49-F238E27FC236}">
-                <a16:creationId xmlns:a16="http://schemas.microsoft.com/office/drawing/2014/main" id="{69A31D8B-8F5D-A44C-AAB4-F0F38E3218B6}"/>
-              </a:ext>
-            </a:extLst>
-          </p:cNvPr>
-          <p:cNvSpPr/>
-          <p:nvPr/>
-        </p:nvSpPr>
-        <p:spPr>
-          <a:xfrm flipH="1">
-            <a:off x="-1" y="4530112"/>
-            <a:ext cx="8710048" cy="1362370"/>
-          </a:xfrm>
-          <a:prstGeom prst="rect">
-            <a:avLst/>
-          </a:prstGeom>
-          <a:noFill/>
-          <a:ln w="57150">
-            <a:solidFill>
-              <a:srgbClr val="C00000"/>
-            </a:solidFill>
-          </a:ln>
-        </p:spPr>
-        <p:style>
-          <a:lnRef idx="2">
-            <a:schemeClr val="accent1">
-              <a:shade val="50000"/>
-            </a:schemeClr>
-          </a:lnRef>
-          <a:fillRef idx="1">
-            <a:schemeClr val="accent1"/>
-          </a:fillRef>
-          <a:effectRef idx="0">
-            <a:schemeClr val="accent1"/>
-          </a:effectRef>
-          <a:fontRef idx="minor">
-            <a:schemeClr val="lt1"/>
-          </a:fontRef>
-        </p:style>
-        <p:txBody>
-          <a:bodyPr rtlCol="0" anchor="ctr"/>
-          <a:lstStyle/>
-          <a:p>
-            <a:pPr algn="ctr"/>
-            <a:endParaRPr lang="en-US"/>
-          </a:p>
-        </p:txBody>
-      </p:sp>
-      <p:sp>
-        <p:nvSpPr>
-          <p:cNvPr id="7" name="Rectangle 6">
-            <a:extLst>
-              <a:ext uri="{FF2B5EF4-FFF2-40B4-BE49-F238E27FC236}">
-                <a16:creationId xmlns:a16="http://schemas.microsoft.com/office/drawing/2014/main" id="{D7ADDF0F-C7F9-AA4D-AE0F-0255F9F606F8}"/>
-              </a:ext>
-            </a:extLst>
-          </p:cNvPr>
-          <p:cNvSpPr/>
-          <p:nvPr/>
-        </p:nvSpPr>
-        <p:spPr>
-          <a:xfrm flipH="1">
-            <a:off x="9267983" y="965516"/>
-            <a:ext cx="2924015" cy="1436721"/>
-          </a:xfrm>
-          <a:prstGeom prst="rect">
-            <a:avLst/>
-          </a:prstGeom>
-          <a:noFill/>
-          <a:ln w="57150">
-            <a:solidFill>
-              <a:srgbClr val="C00000"/>
-            </a:solidFill>
-          </a:ln>
-        </p:spPr>
-        <p:style>
-          <a:lnRef idx="2">
-            <a:schemeClr val="accent1">
-              <a:shade val="50000"/>
-            </a:schemeClr>
-          </a:lnRef>
-          <a:fillRef idx="1">
-            <a:schemeClr val="accent1"/>
-          </a:fillRef>
-          <a:effectRef idx="0">
-            <a:schemeClr val="accent1"/>
-          </a:effectRef>
-          <a:fontRef idx="minor">
-            <a:schemeClr val="lt1"/>
-          </a:fontRef>
-        </p:style>
-        <p:txBody>
-          <a:bodyPr rtlCol="0" anchor="ctr"/>
-          <a:lstStyle/>
-          <a:p>
-            <a:pPr algn="ctr"/>
-            <a:endParaRPr lang="en-US"/>
-          </a:p>
-        </p:txBody>
-      </p:sp>
-      <p:cxnSp>
-        <p:nvCxnSpPr>
-          <p:cNvPr id="8" name="Straight Arrow Connector 7">
-            <a:extLst>
-              <a:ext uri="{FF2B5EF4-FFF2-40B4-BE49-F238E27FC236}">
-                <a16:creationId xmlns:a16="http://schemas.microsoft.com/office/drawing/2014/main" id="{CB95EE6C-AFC1-CB4A-8FB6-73C5FFC1A2C8}"/>
-              </a:ext>
-            </a:extLst>
-          </p:cNvPr>
-          <p:cNvCxnSpPr>
-            <a:cxnSpLocks/>
-          </p:cNvCxnSpPr>
-          <p:nvPr/>
-        </p:nvCxnSpPr>
-        <p:spPr>
-          <a:xfrm flipV="1">
-            <a:off x="8710047" y="2510725"/>
-            <a:ext cx="557936" cy="2019387"/>
-          </a:xfrm>
-          <a:prstGeom prst="straightConnector1">
-            <a:avLst/>
-          </a:prstGeom>
-          <a:ln w="76200">
-            <a:solidFill>
-              <a:srgbClr val="C00000"/>
-            </a:solidFill>
-            <a:tailEnd type="triangle"/>
-          </a:ln>
-        </p:spPr>
-        <p:style>
-          <a:lnRef idx="1">
-            <a:schemeClr val="accent1"/>
-          </a:lnRef>
-          <a:fillRef idx="0">
-            <a:schemeClr val="accent1"/>
-          </a:fillRef>
-          <a:effectRef idx="0">
-            <a:schemeClr val="accent1"/>
-          </a:effectRef>
-          <a:fontRef idx="minor">
-            <a:schemeClr val="tx1"/>
-          </a:fontRef>
-        </p:style>
-      </p:cxnSp>
     </p:spTree>
     <p:extLst>
       <p:ext uri="{BB962C8B-B14F-4D97-AF65-F5344CB8AC3E}">
-        <p14:creationId xmlns:p14="http://schemas.microsoft.com/office/powerpoint/2010/main" val="2486439164"/>
+        <p14:creationId xmlns:p14="http://schemas.microsoft.com/office/powerpoint/2010/main" val="1708211002"/>
       </p:ext>
     </p:extLst>
   </p:cSld>
@@ -4231,6 +4202,14 @@
 <file path=ppt/slides/slide3.xml><?xml version="1.0" encoding="utf-8"?>
 <p:sld xmlns:a="http://schemas.openxmlformats.org/drawingml/2006/main" xmlns:r="http://schemas.openxmlformats.org/officeDocument/2006/relationships" xmlns:p="http://schemas.openxmlformats.org/presentationml/2006/main">
   <p:cSld>
+    <p:bg>
+      <p:bgPr>
+        <a:solidFill>
+          <a:schemeClr val="bg1"/>
+        </a:solidFill>
+        <a:effectLst/>
+      </p:bgPr>
+    </p:bg>
     <p:spTree>
       <p:nvGrpSpPr>
         <p:cNvPr id="1" name=""/>
@@ -4247,10 +4226,10 @@
       </p:grpSpPr>
       <p:pic>
         <p:nvPicPr>
-          <p:cNvPr id="3" name="Picture 2" descr="A screenshot of a computer&#10;&#10;Description automatically generated">
+          <p:cNvPr id="3" name="Picture 2" descr="A screenshot of a cell phone&#10;&#10;Description automatically generated">
             <a:extLst>
               <a:ext uri="{FF2B5EF4-FFF2-40B4-BE49-F238E27FC236}">
-                <a16:creationId xmlns:a16="http://schemas.microsoft.com/office/drawing/2014/main" id="{F15D4619-C426-C94D-805D-D9C83AA0B820}"/>
+                <a16:creationId xmlns:a16="http://schemas.microsoft.com/office/drawing/2014/main" id="{1A2602D8-1465-AF4F-B633-C0FEA79121B4}"/>
               </a:ext>
             </a:extLst>
           </p:cNvPr>
@@ -4267,365 +4246,18 @@
         </p:blipFill>
         <p:spPr>
           <a:xfrm>
-            <a:off x="0" y="763471"/>
-            <a:ext cx="12192000" cy="5331058"/>
+            <a:off x="857152" y="643466"/>
+            <a:ext cx="10477696" cy="5571067"/>
           </a:xfrm>
           <a:prstGeom prst="rect">
             <a:avLst/>
           </a:prstGeom>
         </p:spPr>
       </p:pic>
-      <p:sp>
-        <p:nvSpPr>
-          <p:cNvPr id="4" name="Rounded Rectangular Callout 3">
-            <a:extLst>
-              <a:ext uri="{FF2B5EF4-FFF2-40B4-BE49-F238E27FC236}">
-                <a16:creationId xmlns:a16="http://schemas.microsoft.com/office/drawing/2014/main" id="{6385B431-C10F-7A44-BF60-17EE9AA0A349}"/>
-              </a:ext>
-            </a:extLst>
-          </p:cNvPr>
-          <p:cNvSpPr/>
-          <p:nvPr/>
-        </p:nvSpPr>
-        <p:spPr>
-          <a:xfrm>
-            <a:off x="2613499" y="1673156"/>
-            <a:ext cx="1232160" cy="554477"/>
-          </a:xfrm>
-          <a:prstGeom prst="wedgeRoundRectCallout">
-            <a:avLst>
-              <a:gd name="adj1" fmla="val -69109"/>
-              <a:gd name="adj2" fmla="val -22440"/>
-              <a:gd name="adj3" fmla="val 16667"/>
-            </a:avLst>
-          </a:prstGeom>
-          <a:solidFill>
-            <a:srgbClr val="C00000"/>
-          </a:solidFill>
-          <a:ln>
-            <a:solidFill>
-              <a:srgbClr val="C00000"/>
-            </a:solidFill>
-          </a:ln>
-        </p:spPr>
-        <p:style>
-          <a:lnRef idx="2">
-            <a:schemeClr val="accent1">
-              <a:shade val="50000"/>
-            </a:schemeClr>
-          </a:lnRef>
-          <a:fillRef idx="1">
-            <a:schemeClr val="accent1"/>
-          </a:fillRef>
-          <a:effectRef idx="0">
-            <a:schemeClr val="accent1"/>
-          </a:effectRef>
-          <a:fontRef idx="minor">
-            <a:schemeClr val="lt1"/>
-          </a:fontRef>
-        </p:style>
-        <p:txBody>
-          <a:bodyPr rtlCol="0" anchor="ctr"/>
-          <a:lstStyle/>
-          <a:p>
-            <a:pPr algn="ctr"/>
-            <a:r>
-              <a:rPr lang="en-US" dirty="0"/>
-              <a:t>Header</a:t>
-            </a:r>
-          </a:p>
-        </p:txBody>
-      </p:sp>
-      <p:sp>
-        <p:nvSpPr>
-          <p:cNvPr id="5" name="Rounded Rectangular Callout 4">
-            <a:extLst>
-              <a:ext uri="{FF2B5EF4-FFF2-40B4-BE49-F238E27FC236}">
-                <a16:creationId xmlns:a16="http://schemas.microsoft.com/office/drawing/2014/main" id="{0B487ADA-DACD-644F-8B10-E3E699DB57BE}"/>
-              </a:ext>
-            </a:extLst>
-          </p:cNvPr>
-          <p:cNvSpPr/>
-          <p:nvPr/>
-        </p:nvSpPr>
-        <p:spPr>
-          <a:xfrm>
-            <a:off x="2613499" y="2714017"/>
-            <a:ext cx="2289242" cy="749030"/>
-          </a:xfrm>
-          <a:prstGeom prst="wedgeRoundRectCallout">
-            <a:avLst>
-              <a:gd name="adj1" fmla="val -75316"/>
-              <a:gd name="adj2" fmla="val -42695"/>
-              <a:gd name="adj3" fmla="val 16667"/>
-            </a:avLst>
-          </a:prstGeom>
-          <a:solidFill>
-            <a:srgbClr val="C00000"/>
-          </a:solidFill>
-          <a:ln>
-            <a:solidFill>
-              <a:srgbClr val="C00000"/>
-            </a:solidFill>
-          </a:ln>
-        </p:spPr>
-        <p:style>
-          <a:lnRef idx="2">
-            <a:schemeClr val="accent1">
-              <a:shade val="50000"/>
-            </a:schemeClr>
-          </a:lnRef>
-          <a:fillRef idx="1">
-            <a:schemeClr val="accent1"/>
-          </a:fillRef>
-          <a:effectRef idx="0">
-            <a:schemeClr val="accent1"/>
-          </a:effectRef>
-          <a:fontRef idx="minor">
-            <a:schemeClr val="lt1"/>
-          </a:fontRef>
-        </p:style>
-        <p:txBody>
-          <a:bodyPr rtlCol="0" anchor="ctr"/>
-          <a:lstStyle/>
-          <a:p>
-            <a:pPr algn="ctr"/>
-            <a:r>
-              <a:rPr lang="en-US" dirty="0"/>
-              <a:t>Load packages at the top of the script</a:t>
-            </a:r>
-          </a:p>
-        </p:txBody>
-      </p:sp>
-      <p:cxnSp>
-        <p:nvCxnSpPr>
-          <p:cNvPr id="7" name="Straight Connector 6">
-            <a:extLst>
-              <a:ext uri="{FF2B5EF4-FFF2-40B4-BE49-F238E27FC236}">
-                <a16:creationId xmlns:a16="http://schemas.microsoft.com/office/drawing/2014/main" id="{28995B46-FE84-B74F-9479-1AFB08246758}"/>
-              </a:ext>
-            </a:extLst>
-          </p:cNvPr>
-          <p:cNvCxnSpPr/>
-          <p:nvPr/>
-        </p:nvCxnSpPr>
-        <p:spPr>
-          <a:xfrm>
-            <a:off x="7470843" y="1527243"/>
-            <a:ext cx="0" cy="4474723"/>
-          </a:xfrm>
-          <a:prstGeom prst="line">
-            <a:avLst/>
-          </a:prstGeom>
-          <a:ln w="38100">
-            <a:solidFill>
-              <a:srgbClr val="C00000"/>
-            </a:solidFill>
-            <a:prstDash val="dash"/>
-          </a:ln>
-        </p:spPr>
-        <p:style>
-          <a:lnRef idx="1">
-            <a:schemeClr val="accent1"/>
-          </a:lnRef>
-          <a:fillRef idx="0">
-            <a:schemeClr val="accent1"/>
-          </a:fillRef>
-          <a:effectRef idx="0">
-            <a:schemeClr val="accent1"/>
-          </a:effectRef>
-          <a:fontRef idx="minor">
-            <a:schemeClr val="tx1"/>
-          </a:fontRef>
-        </p:style>
-      </p:cxnSp>
-      <p:sp>
-        <p:nvSpPr>
-          <p:cNvPr id="8" name="Rounded Rectangular Callout 7">
-            <a:extLst>
-              <a:ext uri="{FF2B5EF4-FFF2-40B4-BE49-F238E27FC236}">
-                <a16:creationId xmlns:a16="http://schemas.microsoft.com/office/drawing/2014/main" id="{965B5D70-9B9B-074C-A38B-85DEB1CCCCBF}"/>
-              </a:ext>
-            </a:extLst>
-          </p:cNvPr>
-          <p:cNvSpPr/>
-          <p:nvPr/>
-        </p:nvSpPr>
-        <p:spPr>
-          <a:xfrm>
-            <a:off x="7992898" y="2769291"/>
-            <a:ext cx="1381320" cy="852792"/>
-          </a:xfrm>
-          <a:prstGeom prst="wedgeRoundRectCallout">
-            <a:avLst>
-              <a:gd name="adj1" fmla="val -82358"/>
-              <a:gd name="adj2" fmla="val 5213"/>
-              <a:gd name="adj3" fmla="val 16667"/>
-            </a:avLst>
-          </a:prstGeom>
-          <a:solidFill>
-            <a:srgbClr val="C00000"/>
-          </a:solidFill>
-          <a:ln>
-            <a:solidFill>
-              <a:srgbClr val="C00000"/>
-            </a:solidFill>
-          </a:ln>
-        </p:spPr>
-        <p:style>
-          <a:lnRef idx="2">
-            <a:schemeClr val="accent1">
-              <a:shade val="50000"/>
-            </a:schemeClr>
-          </a:lnRef>
-          <a:fillRef idx="1">
-            <a:schemeClr val="accent1"/>
-          </a:fillRef>
-          <a:effectRef idx="0">
-            <a:schemeClr val="accent1"/>
-          </a:effectRef>
-          <a:fontRef idx="minor">
-            <a:schemeClr val="lt1"/>
-          </a:fontRef>
-        </p:style>
-        <p:txBody>
-          <a:bodyPr rtlCol="0" anchor="ctr"/>
-          <a:lstStyle/>
-          <a:p>
-            <a:pPr algn="ctr"/>
-            <a:r>
-              <a:rPr lang="en-US" dirty="0"/>
-              <a:t>80 characters per line</a:t>
-            </a:r>
-          </a:p>
-        </p:txBody>
-      </p:sp>
-      <p:sp>
-        <p:nvSpPr>
-          <p:cNvPr id="9" name="Rounded Rectangular Callout 8">
-            <a:extLst>
-              <a:ext uri="{FF2B5EF4-FFF2-40B4-BE49-F238E27FC236}">
-                <a16:creationId xmlns:a16="http://schemas.microsoft.com/office/drawing/2014/main" id="{D68B2DAF-A91A-8F4E-9388-A466FF9D1882}"/>
-              </a:ext>
-            </a:extLst>
-          </p:cNvPr>
-          <p:cNvSpPr/>
-          <p:nvPr/>
-        </p:nvSpPr>
-        <p:spPr>
-          <a:xfrm>
-            <a:off x="7804825" y="1527243"/>
-            <a:ext cx="3138786" cy="301710"/>
-          </a:xfrm>
-          <a:prstGeom prst="wedgeRoundRectCallout">
-            <a:avLst>
-              <a:gd name="adj1" fmla="val -65937"/>
-              <a:gd name="adj2" fmla="val -45965"/>
-              <a:gd name="adj3" fmla="val 16667"/>
-            </a:avLst>
-          </a:prstGeom>
-          <a:solidFill>
-            <a:srgbClr val="C00000"/>
-          </a:solidFill>
-          <a:ln>
-            <a:solidFill>
-              <a:srgbClr val="C00000"/>
-            </a:solidFill>
-          </a:ln>
-        </p:spPr>
-        <p:style>
-          <a:lnRef idx="2">
-            <a:schemeClr val="accent1">
-              <a:shade val="50000"/>
-            </a:schemeClr>
-          </a:lnRef>
-          <a:fillRef idx="1">
-            <a:schemeClr val="accent1"/>
-          </a:fillRef>
-          <a:effectRef idx="0">
-            <a:schemeClr val="accent1"/>
-          </a:effectRef>
-          <a:fontRef idx="minor">
-            <a:schemeClr val="lt1"/>
-          </a:fontRef>
-        </p:style>
-        <p:txBody>
-          <a:bodyPr rtlCol="0" anchor="ctr"/>
-          <a:lstStyle/>
-          <a:p>
-            <a:pPr algn="ctr"/>
-            <a:r>
-              <a:rPr lang="en-US" dirty="0"/>
-              <a:t>Decorate with comments</a:t>
-            </a:r>
-          </a:p>
-        </p:txBody>
-      </p:sp>
-      <p:sp>
-        <p:nvSpPr>
-          <p:cNvPr id="10" name="Rounded Rectangular Callout 9">
-            <a:extLst>
-              <a:ext uri="{FF2B5EF4-FFF2-40B4-BE49-F238E27FC236}">
-                <a16:creationId xmlns:a16="http://schemas.microsoft.com/office/drawing/2014/main" id="{07E20E95-E131-6F49-B177-063F610DEF26}"/>
-              </a:ext>
-            </a:extLst>
-          </p:cNvPr>
-          <p:cNvSpPr/>
-          <p:nvPr/>
-        </p:nvSpPr>
-        <p:spPr>
-          <a:xfrm>
-            <a:off x="7744848" y="4750039"/>
-            <a:ext cx="3138786" cy="301710"/>
-          </a:xfrm>
-          <a:prstGeom prst="wedgeRoundRectCallout">
-            <a:avLst>
-              <a:gd name="adj1" fmla="val -65937"/>
-              <a:gd name="adj2" fmla="val -45965"/>
-              <a:gd name="adj3" fmla="val 16667"/>
-            </a:avLst>
-          </a:prstGeom>
-          <a:solidFill>
-            <a:srgbClr val="C00000"/>
-          </a:solidFill>
-          <a:ln>
-            <a:solidFill>
-              <a:srgbClr val="C00000"/>
-            </a:solidFill>
-          </a:ln>
-        </p:spPr>
-        <p:style>
-          <a:lnRef idx="2">
-            <a:schemeClr val="accent1">
-              <a:shade val="50000"/>
-            </a:schemeClr>
-          </a:lnRef>
-          <a:fillRef idx="1">
-            <a:schemeClr val="accent1"/>
-          </a:fillRef>
-          <a:effectRef idx="0">
-            <a:schemeClr val="accent1"/>
-          </a:effectRef>
-          <a:fontRef idx="minor">
-            <a:schemeClr val="lt1"/>
-          </a:fontRef>
-        </p:style>
-        <p:txBody>
-          <a:bodyPr rtlCol="0" anchor="ctr"/>
-          <a:lstStyle/>
-          <a:p>
-            <a:pPr algn="ctr"/>
-            <a:r>
-              <a:rPr lang="en-US" dirty="0"/>
-              <a:t>Decorate with comments</a:t>
-            </a:r>
-          </a:p>
-        </p:txBody>
-      </p:sp>
     </p:spTree>
     <p:extLst>
       <p:ext uri="{BB962C8B-B14F-4D97-AF65-F5344CB8AC3E}">
-        <p14:creationId xmlns:p14="http://schemas.microsoft.com/office/powerpoint/2010/main" val="2289272228"/>
+        <p14:creationId xmlns:p14="http://schemas.microsoft.com/office/powerpoint/2010/main" val="1160964407"/>
       </p:ext>
     </p:extLst>
   </p:cSld>
@@ -4636,162 +4268,6 @@
 </file>
 
 <file path=ppt/slides/slide4.xml><?xml version="1.0" encoding="utf-8"?>
-<p:sld xmlns:a="http://schemas.openxmlformats.org/drawingml/2006/main" xmlns:r="http://schemas.openxmlformats.org/officeDocument/2006/relationships" xmlns:p="http://schemas.openxmlformats.org/presentationml/2006/main">
-  <p:cSld>
-    <p:spTree>
-      <p:nvGrpSpPr>
-        <p:cNvPr id="1" name=""/>
-        <p:cNvGrpSpPr/>
-        <p:nvPr/>
-      </p:nvGrpSpPr>
-      <p:grpSpPr>
-        <a:xfrm>
-          <a:off x="0" y="0"/>
-          <a:ext cx="0" cy="0"/>
-          <a:chOff x="0" y="0"/>
-          <a:chExt cx="0" cy="0"/>
-        </a:xfrm>
-      </p:grpSpPr>
-      <p:pic>
-        <p:nvPicPr>
-          <p:cNvPr id="3" name="Picture 2" descr="A screenshot of a computer&#10;&#10;Description automatically generated">
-            <a:extLst>
-              <a:ext uri="{FF2B5EF4-FFF2-40B4-BE49-F238E27FC236}">
-                <a16:creationId xmlns:a16="http://schemas.microsoft.com/office/drawing/2014/main" id="{A25AD094-BB56-AE46-9354-1ADA9E91D60C}"/>
-              </a:ext>
-            </a:extLst>
-          </p:cNvPr>
-          <p:cNvPicPr>
-            <a:picLocks noChangeAspect="1"/>
-          </p:cNvPicPr>
-          <p:nvPr/>
-        </p:nvPicPr>
-        <p:blipFill>
-          <a:blip r:embed="rId3"/>
-          <a:stretch>
-            <a:fillRect/>
-          </a:stretch>
-        </p:blipFill>
-        <p:spPr>
-          <a:xfrm>
-            <a:off x="2969691" y="0"/>
-            <a:ext cx="6252617" cy="6858000"/>
-          </a:xfrm>
-          <a:prstGeom prst="rect">
-            <a:avLst/>
-          </a:prstGeom>
-        </p:spPr>
-      </p:pic>
-      <p:sp>
-        <p:nvSpPr>
-          <p:cNvPr id="4" name="Rectangle 3">
-            <a:extLst>
-              <a:ext uri="{FF2B5EF4-FFF2-40B4-BE49-F238E27FC236}">
-                <a16:creationId xmlns:a16="http://schemas.microsoft.com/office/drawing/2014/main" id="{D856CD63-3346-3140-B4EB-8FC52F7D7EC6}"/>
-              </a:ext>
-            </a:extLst>
-          </p:cNvPr>
-          <p:cNvSpPr/>
-          <p:nvPr/>
-        </p:nvSpPr>
-        <p:spPr>
-          <a:xfrm flipH="1">
-            <a:off x="2969691" y="6602278"/>
-            <a:ext cx="579421" cy="255722"/>
-          </a:xfrm>
-          <a:prstGeom prst="rect">
-            <a:avLst/>
-          </a:prstGeom>
-          <a:noFill/>
-          <a:ln w="57150">
-            <a:solidFill>
-              <a:srgbClr val="C00000"/>
-            </a:solidFill>
-          </a:ln>
-        </p:spPr>
-        <p:style>
-          <a:lnRef idx="2">
-            <a:schemeClr val="accent1">
-              <a:shade val="50000"/>
-            </a:schemeClr>
-          </a:lnRef>
-          <a:fillRef idx="1">
-            <a:schemeClr val="accent1"/>
-          </a:fillRef>
-          <a:effectRef idx="0">
-            <a:schemeClr val="accent1"/>
-          </a:effectRef>
-          <a:fontRef idx="minor">
-            <a:schemeClr val="lt1"/>
-          </a:fontRef>
-        </p:style>
-        <p:txBody>
-          <a:bodyPr rtlCol="0" anchor="ctr"/>
-          <a:lstStyle/>
-          <a:p>
-            <a:pPr algn="ctr"/>
-            <a:endParaRPr lang="en-US"/>
-          </a:p>
-        </p:txBody>
-      </p:sp>
-      <p:cxnSp>
-        <p:nvCxnSpPr>
-          <p:cNvPr id="5" name="Straight Arrow Connector 4">
-            <a:extLst>
-              <a:ext uri="{FF2B5EF4-FFF2-40B4-BE49-F238E27FC236}">
-                <a16:creationId xmlns:a16="http://schemas.microsoft.com/office/drawing/2014/main" id="{80D965DC-D83D-9D4D-818D-AE3FEC746DEE}"/>
-              </a:ext>
-            </a:extLst>
-          </p:cNvPr>
-          <p:cNvCxnSpPr>
-            <a:cxnSpLocks/>
-          </p:cNvCxnSpPr>
-          <p:nvPr/>
-        </p:nvCxnSpPr>
-        <p:spPr>
-          <a:xfrm flipV="1">
-            <a:off x="3322211" y="3611105"/>
-            <a:ext cx="335389" cy="2991174"/>
-          </a:xfrm>
-          <a:prstGeom prst="straightConnector1">
-            <a:avLst/>
-          </a:prstGeom>
-          <a:ln w="76200">
-            <a:solidFill>
-              <a:srgbClr val="C00000"/>
-            </a:solidFill>
-            <a:tailEnd type="triangle"/>
-          </a:ln>
-        </p:spPr>
-        <p:style>
-          <a:lnRef idx="1">
-            <a:schemeClr val="accent1"/>
-          </a:lnRef>
-          <a:fillRef idx="0">
-            <a:schemeClr val="accent1"/>
-          </a:fillRef>
-          <a:effectRef idx="0">
-            <a:schemeClr val="accent1"/>
-          </a:effectRef>
-          <a:fontRef idx="minor">
-            <a:schemeClr val="tx1"/>
-          </a:fontRef>
-        </p:style>
-      </p:cxnSp>
-    </p:spTree>
-    <p:extLst>
-      <p:ext uri="{BB962C8B-B14F-4D97-AF65-F5344CB8AC3E}">
-        <p14:creationId xmlns:p14="http://schemas.microsoft.com/office/powerpoint/2010/main" val="3244665502"/>
-      </p:ext>
-    </p:extLst>
-  </p:cSld>
-  <p:clrMapOvr>
-    <a:masterClrMapping/>
-  </p:clrMapOvr>
-</p:sld>
-</file>
-
-<file path=ppt/slides/slide5.xml><?xml version="1.0" encoding="utf-8"?>
 <p:sld xmlns:a="http://schemas.openxmlformats.org/drawingml/2006/main" xmlns:r="http://schemas.openxmlformats.org/officeDocument/2006/relationships" xmlns:p="http://schemas.openxmlformats.org/presentationml/2006/main">
   <p:cSld>
     <p:bg>
@@ -4965,7 +4441,7 @@
 </p:sld>
 </file>
 
-<file path=ppt/slides/slide6.xml><?xml version="1.0" encoding="utf-8"?>
+<file path=ppt/slides/slide5.xml><?xml version="1.0" encoding="utf-8"?>
 <p:sld xmlns:a="http://schemas.openxmlformats.org/drawingml/2006/main" xmlns:r="http://schemas.openxmlformats.org/officeDocument/2006/relationships" xmlns:p="http://schemas.openxmlformats.org/presentationml/2006/main">
   <p:cSld>
     <p:spTree>
@@ -5026,7 +4502,7 @@
         </p:nvSpPr>
         <p:spPr>
           <a:xfrm flipH="1">
-            <a:off x="380054" y="388085"/>
+            <a:off x="369376" y="824287"/>
             <a:ext cx="2394141" cy="417827"/>
           </a:xfrm>
           <a:prstGeom prst="rect">
@@ -5078,7 +4554,7 @@
         </p:nvSpPr>
         <p:spPr>
           <a:xfrm>
-            <a:off x="2784872" y="-17123"/>
+            <a:off x="2763517" y="419079"/>
             <a:ext cx="2479656" cy="1228241"/>
           </a:xfrm>
           <a:prstGeom prst="leftArrow">
@@ -5122,6 +4598,441 @@
     <p:extLst>
       <p:ext uri="{BB962C8B-B14F-4D97-AF65-F5344CB8AC3E}">
         <p14:creationId xmlns:p14="http://schemas.microsoft.com/office/powerpoint/2010/main" val="3249394052"/>
+      </p:ext>
+    </p:extLst>
+  </p:cSld>
+  <p:clrMapOvr>
+    <a:masterClrMapping/>
+  </p:clrMapOvr>
+</p:sld>
+</file>
+
+<file path=ppt/slides/slide6.xml><?xml version="1.0" encoding="utf-8"?>
+<p:sld xmlns:a="http://schemas.openxmlformats.org/drawingml/2006/main" xmlns:r="http://schemas.openxmlformats.org/officeDocument/2006/relationships" xmlns:p="http://schemas.openxmlformats.org/presentationml/2006/main">
+  <p:cSld>
+    <p:bg>
+      <p:bgPr>
+        <a:solidFill>
+          <a:schemeClr val="bg1"/>
+        </a:solidFill>
+        <a:effectLst/>
+      </p:bgPr>
+    </p:bg>
+    <p:spTree>
+      <p:nvGrpSpPr>
+        <p:cNvPr id="1" name=""/>
+        <p:cNvGrpSpPr/>
+        <p:nvPr/>
+      </p:nvGrpSpPr>
+      <p:grpSpPr>
+        <a:xfrm>
+          <a:off x="0" y="0"/>
+          <a:ext cx="0" cy="0"/>
+          <a:chOff x="0" y="0"/>
+          <a:chExt cx="0" cy="0"/>
+        </a:xfrm>
+      </p:grpSpPr>
+      <p:pic>
+        <p:nvPicPr>
+          <p:cNvPr id="3" name="Picture 2" descr="A screenshot of a cell phone&#10;&#10;Description automatically generated">
+            <a:extLst>
+              <a:ext uri="{FF2B5EF4-FFF2-40B4-BE49-F238E27FC236}">
+                <a16:creationId xmlns:a16="http://schemas.microsoft.com/office/drawing/2014/main" id="{69D2EB84-5B22-0D4F-8C39-918C4B5B60AD}"/>
+              </a:ext>
+            </a:extLst>
+          </p:cNvPr>
+          <p:cNvPicPr>
+            <a:picLocks noChangeAspect="1"/>
+          </p:cNvPicPr>
+          <p:nvPr/>
+        </p:nvPicPr>
+        <p:blipFill>
+          <a:blip r:embed="rId3"/>
+          <a:stretch>
+            <a:fillRect/>
+          </a:stretch>
+        </p:blipFill>
+        <p:spPr>
+          <a:xfrm>
+            <a:off x="0" y="354495"/>
+            <a:ext cx="12192000" cy="6149009"/>
+          </a:xfrm>
+          <a:prstGeom prst="rect">
+            <a:avLst/>
+          </a:prstGeom>
+        </p:spPr>
+      </p:pic>
+      <p:sp>
+        <p:nvSpPr>
+          <p:cNvPr id="6" name="Rounded Rectangular Callout 5">
+            <a:extLst>
+              <a:ext uri="{FF2B5EF4-FFF2-40B4-BE49-F238E27FC236}">
+                <a16:creationId xmlns:a16="http://schemas.microsoft.com/office/drawing/2014/main" id="{AA50E0AB-621D-514E-ADBB-B71EA251AA8F}"/>
+              </a:ext>
+            </a:extLst>
+          </p:cNvPr>
+          <p:cNvSpPr/>
+          <p:nvPr/>
+        </p:nvSpPr>
+        <p:spPr>
+          <a:xfrm>
+            <a:off x="2892469" y="499161"/>
+            <a:ext cx="2252968" cy="798576"/>
+          </a:xfrm>
+          <a:prstGeom prst="wedgeRoundRectCallout">
+            <a:avLst>
+              <a:gd name="adj1" fmla="val -76184"/>
+              <a:gd name="adj2" fmla="val 40994"/>
+              <a:gd name="adj3" fmla="val 16667"/>
+            </a:avLst>
+          </a:prstGeom>
+          <a:solidFill>
+            <a:srgbClr val="C00000"/>
+          </a:solidFill>
+          <a:ln>
+            <a:solidFill>
+              <a:srgbClr val="C00000"/>
+            </a:solidFill>
+          </a:ln>
+        </p:spPr>
+        <p:style>
+          <a:lnRef idx="2">
+            <a:schemeClr val="accent1">
+              <a:shade val="50000"/>
+            </a:schemeClr>
+          </a:lnRef>
+          <a:fillRef idx="1">
+            <a:schemeClr val="accent1"/>
+          </a:fillRef>
+          <a:effectRef idx="0">
+            <a:schemeClr val="accent1"/>
+          </a:effectRef>
+          <a:fontRef idx="minor">
+            <a:schemeClr val="lt1"/>
+          </a:fontRef>
+        </p:style>
+        <p:txBody>
+          <a:bodyPr rtlCol="0" anchor="ctr"/>
+          <a:lstStyle/>
+          <a:p>
+            <a:pPr algn="ctr"/>
+            <a:r>
+              <a:rPr lang="en-US" sz="2800" dirty="0"/>
+              <a:t>YAML header</a:t>
+            </a:r>
+          </a:p>
+        </p:txBody>
+      </p:sp>
+      <p:sp>
+        <p:nvSpPr>
+          <p:cNvPr id="7" name="Rounded Rectangular Callout 6">
+            <a:extLst>
+              <a:ext uri="{FF2B5EF4-FFF2-40B4-BE49-F238E27FC236}">
+                <a16:creationId xmlns:a16="http://schemas.microsoft.com/office/drawing/2014/main" id="{78118BAB-0A04-C149-AAE6-47B2B5C95112}"/>
+              </a:ext>
+            </a:extLst>
+          </p:cNvPr>
+          <p:cNvSpPr/>
+          <p:nvPr/>
+        </p:nvSpPr>
+        <p:spPr>
+          <a:xfrm>
+            <a:off x="5268874" y="2320045"/>
+            <a:ext cx="1965052" cy="934599"/>
+          </a:xfrm>
+          <a:prstGeom prst="wedgeRoundRectCallout">
+            <a:avLst>
+              <a:gd name="adj1" fmla="val -82823"/>
+              <a:gd name="adj2" fmla="val -69957"/>
+              <a:gd name="adj3" fmla="val 16667"/>
+            </a:avLst>
+          </a:prstGeom>
+          <a:solidFill>
+            <a:srgbClr val="C00000"/>
+          </a:solidFill>
+          <a:ln>
+            <a:solidFill>
+              <a:srgbClr val="C00000"/>
+            </a:solidFill>
+          </a:ln>
+        </p:spPr>
+        <p:style>
+          <a:lnRef idx="2">
+            <a:schemeClr val="accent1">
+              <a:shade val="50000"/>
+            </a:schemeClr>
+          </a:lnRef>
+          <a:fillRef idx="1">
+            <a:schemeClr val="accent1"/>
+          </a:fillRef>
+          <a:effectRef idx="0">
+            <a:schemeClr val="accent1"/>
+          </a:effectRef>
+          <a:fontRef idx="minor">
+            <a:schemeClr val="lt1"/>
+          </a:fontRef>
+        </p:style>
+        <p:txBody>
+          <a:bodyPr rtlCol="0" anchor="ctr"/>
+          <a:lstStyle/>
+          <a:p>
+            <a:pPr algn="ctr"/>
+            <a:r>
+              <a:rPr lang="en-US" sz="2400" dirty="0"/>
+              <a:t>Link to a website</a:t>
+            </a:r>
+          </a:p>
+        </p:txBody>
+      </p:sp>
+      <p:sp>
+        <p:nvSpPr>
+          <p:cNvPr id="8" name="Rounded Rectangular Callout 7">
+            <a:extLst>
+              <a:ext uri="{FF2B5EF4-FFF2-40B4-BE49-F238E27FC236}">
+                <a16:creationId xmlns:a16="http://schemas.microsoft.com/office/drawing/2014/main" id="{5A71AA50-ACF6-2447-AEE4-3263F491EBF4}"/>
+              </a:ext>
+            </a:extLst>
+          </p:cNvPr>
+          <p:cNvSpPr/>
+          <p:nvPr/>
+        </p:nvSpPr>
+        <p:spPr>
+          <a:xfrm>
+            <a:off x="7161198" y="970963"/>
+            <a:ext cx="2252968" cy="881249"/>
+          </a:xfrm>
+          <a:prstGeom prst="wedgeRoundRectCallout">
+            <a:avLst>
+              <a:gd name="adj1" fmla="val -82823"/>
+              <a:gd name="adj2" fmla="val 67004"/>
+              <a:gd name="adj3" fmla="val 16667"/>
+            </a:avLst>
+          </a:prstGeom>
+          <a:solidFill>
+            <a:srgbClr val="C00000"/>
+          </a:solidFill>
+          <a:ln>
+            <a:solidFill>
+              <a:srgbClr val="C00000"/>
+            </a:solidFill>
+          </a:ln>
+        </p:spPr>
+        <p:style>
+          <a:lnRef idx="2">
+            <a:schemeClr val="accent1">
+              <a:shade val="50000"/>
+            </a:schemeClr>
+          </a:lnRef>
+          <a:fillRef idx="1">
+            <a:schemeClr val="accent1"/>
+          </a:fillRef>
+          <a:effectRef idx="0">
+            <a:schemeClr val="accent1"/>
+          </a:effectRef>
+          <a:fontRef idx="minor">
+            <a:schemeClr val="lt1"/>
+          </a:fontRef>
+        </p:style>
+        <p:txBody>
+          <a:bodyPr rtlCol="0" anchor="ctr"/>
+          <a:lstStyle/>
+          <a:p>
+            <a:pPr algn="ctr"/>
+            <a:r>
+              <a:rPr lang="en-US" sz="2800" dirty="0"/>
+              <a:t>Explanatory text</a:t>
+            </a:r>
+          </a:p>
+        </p:txBody>
+      </p:sp>
+      <p:sp>
+        <p:nvSpPr>
+          <p:cNvPr id="9" name="Rounded Rectangular Callout 8">
+            <a:extLst>
+              <a:ext uri="{FF2B5EF4-FFF2-40B4-BE49-F238E27FC236}">
+                <a16:creationId xmlns:a16="http://schemas.microsoft.com/office/drawing/2014/main" id="{7C03DBAF-BAF1-B74D-B035-91516C15C4C0}"/>
+              </a:ext>
+            </a:extLst>
+          </p:cNvPr>
+          <p:cNvSpPr/>
+          <p:nvPr/>
+        </p:nvSpPr>
+        <p:spPr>
+          <a:xfrm>
+            <a:off x="2210269" y="2874522"/>
+            <a:ext cx="1965052" cy="798576"/>
+          </a:xfrm>
+          <a:prstGeom prst="wedgeRoundRectCallout">
+            <a:avLst>
+              <a:gd name="adj1" fmla="val -101752"/>
+              <a:gd name="adj2" fmla="val -922"/>
+              <a:gd name="adj3" fmla="val 16667"/>
+            </a:avLst>
+          </a:prstGeom>
+          <a:solidFill>
+            <a:srgbClr val="C00000"/>
+          </a:solidFill>
+          <a:ln>
+            <a:solidFill>
+              <a:srgbClr val="C00000"/>
+            </a:solidFill>
+          </a:ln>
+        </p:spPr>
+        <p:style>
+          <a:lnRef idx="2">
+            <a:schemeClr val="accent1">
+              <a:shade val="50000"/>
+            </a:schemeClr>
+          </a:lnRef>
+          <a:fillRef idx="1">
+            <a:schemeClr val="accent1"/>
+          </a:fillRef>
+          <a:effectRef idx="0">
+            <a:schemeClr val="accent1"/>
+          </a:effectRef>
+          <a:fontRef idx="minor">
+            <a:schemeClr val="lt1"/>
+          </a:fontRef>
+        </p:style>
+        <p:txBody>
+          <a:bodyPr rtlCol="0" anchor="ctr"/>
+          <a:lstStyle/>
+          <a:p>
+            <a:pPr algn="ctr"/>
+            <a:r>
+              <a:rPr lang="en-US" sz="2800" dirty="0"/>
+              <a:t>R code chunk</a:t>
+            </a:r>
+          </a:p>
+        </p:txBody>
+      </p:sp>
+      <p:sp>
+        <p:nvSpPr>
+          <p:cNvPr id="10" name="Rounded Rectangular Callout 9">
+            <a:extLst>
+              <a:ext uri="{FF2B5EF4-FFF2-40B4-BE49-F238E27FC236}">
+                <a16:creationId xmlns:a16="http://schemas.microsoft.com/office/drawing/2014/main" id="{72A41673-A729-BB41-B1B0-A6B4CD2403C1}"/>
+              </a:ext>
+            </a:extLst>
+          </p:cNvPr>
+          <p:cNvSpPr/>
+          <p:nvPr/>
+        </p:nvSpPr>
+        <p:spPr>
+          <a:xfrm>
+            <a:off x="9089975" y="3459995"/>
+            <a:ext cx="2092545" cy="554477"/>
+          </a:xfrm>
+          <a:prstGeom prst="wedgeRoundRectCallout">
+            <a:avLst>
+              <a:gd name="adj1" fmla="val 79611"/>
+              <a:gd name="adj2" fmla="val -78343"/>
+              <a:gd name="adj3" fmla="val 16667"/>
+            </a:avLst>
+          </a:prstGeom>
+          <a:solidFill>
+            <a:srgbClr val="C00000"/>
+          </a:solidFill>
+          <a:ln>
+            <a:solidFill>
+              <a:srgbClr val="C00000"/>
+            </a:solidFill>
+          </a:ln>
+        </p:spPr>
+        <p:style>
+          <a:lnRef idx="2">
+            <a:schemeClr val="accent1">
+              <a:shade val="50000"/>
+            </a:schemeClr>
+          </a:lnRef>
+          <a:fillRef idx="1">
+            <a:schemeClr val="accent1"/>
+          </a:fillRef>
+          <a:effectRef idx="0">
+            <a:schemeClr val="accent1"/>
+          </a:effectRef>
+          <a:fontRef idx="minor">
+            <a:schemeClr val="lt1"/>
+          </a:fontRef>
+        </p:style>
+        <p:txBody>
+          <a:bodyPr rtlCol="0" anchor="ctr"/>
+          <a:lstStyle/>
+          <a:p>
+            <a:pPr algn="ctr"/>
+            <a:r>
+              <a:rPr lang="en-US" sz="2800" dirty="0"/>
+              <a:t>Play button</a:t>
+            </a:r>
+          </a:p>
+        </p:txBody>
+      </p:sp>
+      <p:sp>
+        <p:nvSpPr>
+          <p:cNvPr id="11" name="Rounded Rectangular Callout 10">
+            <a:extLst>
+              <a:ext uri="{FF2B5EF4-FFF2-40B4-BE49-F238E27FC236}">
+                <a16:creationId xmlns:a16="http://schemas.microsoft.com/office/drawing/2014/main" id="{71F59FBD-5B8E-BD46-89B5-5698DD1FA711}"/>
+              </a:ext>
+            </a:extLst>
+          </p:cNvPr>
+          <p:cNvSpPr/>
+          <p:nvPr/>
+        </p:nvSpPr>
+        <p:spPr>
+          <a:xfrm>
+            <a:off x="4731601" y="4285595"/>
+            <a:ext cx="1901672" cy="554477"/>
+          </a:xfrm>
+          <a:prstGeom prst="wedgeRoundRectCallout">
+            <a:avLst>
+              <a:gd name="adj1" fmla="val -82823"/>
+              <a:gd name="adj2" fmla="val -69957"/>
+              <a:gd name="adj3" fmla="val 16667"/>
+            </a:avLst>
+          </a:prstGeom>
+          <a:solidFill>
+            <a:srgbClr val="C00000"/>
+          </a:solidFill>
+          <a:ln>
+            <a:solidFill>
+              <a:srgbClr val="C00000"/>
+            </a:solidFill>
+          </a:ln>
+        </p:spPr>
+        <p:style>
+          <a:lnRef idx="2">
+            <a:schemeClr val="accent1">
+              <a:shade val="50000"/>
+            </a:schemeClr>
+          </a:lnRef>
+          <a:fillRef idx="1">
+            <a:schemeClr val="accent1"/>
+          </a:fillRef>
+          <a:effectRef idx="0">
+            <a:schemeClr val="accent1"/>
+          </a:effectRef>
+          <a:fontRef idx="minor">
+            <a:schemeClr val="lt1"/>
+          </a:fontRef>
+        </p:style>
+        <p:txBody>
+          <a:bodyPr rtlCol="0" anchor="ctr"/>
+          <a:lstStyle/>
+          <a:p>
+            <a:pPr algn="ctr"/>
+            <a:r>
+              <a:rPr lang="en-US" sz="2800" dirty="0"/>
+              <a:t>Formatting</a:t>
+            </a:r>
+            <a:endParaRPr lang="en-US" dirty="0"/>
+          </a:p>
+        </p:txBody>
+      </p:sp>
+    </p:spTree>
+    <p:extLst>
+      <p:ext uri="{BB962C8B-B14F-4D97-AF65-F5344CB8AC3E}">
+        <p14:creationId xmlns:p14="http://schemas.microsoft.com/office/powerpoint/2010/main" val="277171077"/>
       </p:ext>
     </p:extLst>
   </p:cSld>
@@ -5158,10 +5069,175 @@
       </p:grpSpPr>
       <p:pic>
         <p:nvPicPr>
-          <p:cNvPr id="5" name="Picture 4" descr="A screenshot of a computer screen&#10;&#10;Description automatically generated">
+          <p:cNvPr id="2" name="Picture 1" descr="A screenshot of a cell phone&#10;&#10;Description automatically generated">
             <a:extLst>
               <a:ext uri="{FF2B5EF4-FFF2-40B4-BE49-F238E27FC236}">
-                <a16:creationId xmlns:a16="http://schemas.microsoft.com/office/drawing/2014/main" id="{E2C0A9C7-BDE6-5541-9E59-3B9B039ED038}"/>
+                <a16:creationId xmlns:a16="http://schemas.microsoft.com/office/drawing/2014/main" id="{3BD59339-B0FF-8548-B71A-D60181390782}"/>
+              </a:ext>
+            </a:extLst>
+          </p:cNvPr>
+          <p:cNvPicPr>
+            <a:picLocks noChangeAspect="1"/>
+          </p:cNvPicPr>
+          <p:nvPr/>
+        </p:nvPicPr>
+        <p:blipFill rotWithShape="1">
+          <a:blip r:embed="rId3"/>
+          <a:srcRect r="10221" b="-1"/>
+          <a:stretch/>
+        </p:blipFill>
+        <p:spPr>
+          <a:xfrm>
+            <a:off x="20" y="10"/>
+            <a:ext cx="12191980" cy="6857990"/>
+          </a:xfrm>
+          <a:prstGeom prst="rect">
+            <a:avLst/>
+          </a:prstGeom>
+        </p:spPr>
+      </p:pic>
+      <p:sp>
+        <p:nvSpPr>
+          <p:cNvPr id="3" name="Rectangle 2">
+            <a:extLst>
+              <a:ext uri="{FF2B5EF4-FFF2-40B4-BE49-F238E27FC236}">
+                <a16:creationId xmlns:a16="http://schemas.microsoft.com/office/drawing/2014/main" id="{6B536026-8AB7-674F-BBBA-91F810DCB075}"/>
+              </a:ext>
+            </a:extLst>
+          </p:cNvPr>
+          <p:cNvSpPr/>
+          <p:nvPr/>
+        </p:nvSpPr>
+        <p:spPr>
+          <a:xfrm flipH="1">
+            <a:off x="2167179" y="281846"/>
+            <a:ext cx="1335438" cy="417827"/>
+          </a:xfrm>
+          <a:prstGeom prst="rect">
+            <a:avLst/>
+          </a:prstGeom>
+          <a:noFill/>
+          <a:ln w="76200">
+            <a:solidFill>
+              <a:srgbClr val="C00000"/>
+            </a:solidFill>
+          </a:ln>
+        </p:spPr>
+        <p:style>
+          <a:lnRef idx="2">
+            <a:schemeClr val="accent1">
+              <a:shade val="50000"/>
+            </a:schemeClr>
+          </a:lnRef>
+          <a:fillRef idx="1">
+            <a:schemeClr val="accent1"/>
+          </a:fillRef>
+          <a:effectRef idx="0">
+            <a:schemeClr val="accent1"/>
+          </a:effectRef>
+          <a:fontRef idx="minor">
+            <a:schemeClr val="lt1"/>
+          </a:fontRef>
+        </p:style>
+        <p:txBody>
+          <a:bodyPr rtlCol="0" anchor="ctr"/>
+          <a:lstStyle/>
+          <a:p>
+            <a:pPr algn="ctr"/>
+            <a:endParaRPr lang="en-US"/>
+          </a:p>
+        </p:txBody>
+      </p:sp>
+      <p:sp>
+        <p:nvSpPr>
+          <p:cNvPr id="4" name="Left Arrow 3">
+            <a:extLst>
+              <a:ext uri="{FF2B5EF4-FFF2-40B4-BE49-F238E27FC236}">
+                <a16:creationId xmlns:a16="http://schemas.microsoft.com/office/drawing/2014/main" id="{A305AE50-76DA-5F4C-B360-FD6F80D650A5}"/>
+              </a:ext>
+            </a:extLst>
+          </p:cNvPr>
+          <p:cNvSpPr/>
+          <p:nvPr/>
+        </p:nvSpPr>
+        <p:spPr>
+          <a:xfrm rot="2077423">
+            <a:off x="3391755" y="877537"/>
+            <a:ext cx="2479656" cy="1228241"/>
+          </a:xfrm>
+          <a:prstGeom prst="leftArrow">
+            <a:avLst/>
+          </a:prstGeom>
+          <a:solidFill>
+            <a:srgbClr val="C00000"/>
+          </a:solidFill>
+          <a:ln>
+            <a:solidFill>
+              <a:srgbClr val="C00000"/>
+            </a:solidFill>
+          </a:ln>
+        </p:spPr>
+        <p:style>
+          <a:lnRef idx="2">
+            <a:schemeClr val="accent1">
+              <a:shade val="50000"/>
+            </a:schemeClr>
+          </a:lnRef>
+          <a:fillRef idx="1">
+            <a:schemeClr val="accent1"/>
+          </a:fillRef>
+          <a:effectRef idx="0">
+            <a:schemeClr val="accent1"/>
+          </a:effectRef>
+          <a:fontRef idx="minor">
+            <a:schemeClr val="lt1"/>
+          </a:fontRef>
+        </p:style>
+        <p:txBody>
+          <a:bodyPr rtlCol="0" anchor="ctr"/>
+          <a:lstStyle/>
+          <a:p>
+            <a:pPr algn="ctr"/>
+            <a:endParaRPr lang="en-US"/>
+          </a:p>
+        </p:txBody>
+      </p:sp>
+    </p:spTree>
+    <p:extLst>
+      <p:ext uri="{BB962C8B-B14F-4D97-AF65-F5344CB8AC3E}">
+        <p14:creationId xmlns:p14="http://schemas.microsoft.com/office/powerpoint/2010/main" val="1793037943"/>
+      </p:ext>
+    </p:extLst>
+  </p:cSld>
+  <p:clrMapOvr>
+    <a:masterClrMapping/>
+  </p:clrMapOvr>
+</p:sld>
+</file>
+
+<file path=ppt/slides/slide8.xml><?xml version="1.0" encoding="utf-8"?>
+<p:sld xmlns:a="http://schemas.openxmlformats.org/drawingml/2006/main" xmlns:r="http://schemas.openxmlformats.org/officeDocument/2006/relationships" xmlns:p="http://schemas.openxmlformats.org/presentationml/2006/main">
+  <p:cSld>
+    <p:spTree>
+      <p:nvGrpSpPr>
+        <p:cNvPr id="1" name=""/>
+        <p:cNvGrpSpPr/>
+        <p:nvPr/>
+      </p:nvGrpSpPr>
+      <p:grpSpPr>
+        <a:xfrm>
+          <a:off x="0" y="0"/>
+          <a:ext cx="0" cy="0"/>
+          <a:chOff x="0" y="0"/>
+          <a:chExt cx="0" cy="0"/>
+        </a:xfrm>
+      </p:grpSpPr>
+      <p:pic>
+        <p:nvPicPr>
+          <p:cNvPr id="3" name="Picture 2" descr="A screenshot of a social media post&#10;&#10;Description automatically generated">
+            <a:extLst>
+              <a:ext uri="{FF2B5EF4-FFF2-40B4-BE49-F238E27FC236}">
+                <a16:creationId xmlns:a16="http://schemas.microsoft.com/office/drawing/2014/main" id="{52F7CD1D-AC0F-1643-AA8B-FFD9C3B5E42B}"/>
               </a:ext>
             </a:extLst>
           </p:cNvPr>
@@ -5178,8 +5254,8 @@
         </p:blipFill>
         <p:spPr>
           <a:xfrm>
-            <a:off x="-1" y="0"/>
-            <a:ext cx="18640153" cy="6858000"/>
+            <a:off x="2485731" y="0"/>
+            <a:ext cx="7220537" cy="6858000"/>
           </a:xfrm>
           <a:prstGeom prst="rect">
             <a:avLst/>
@@ -5189,7 +5265,135 @@
     </p:spTree>
     <p:extLst>
       <p:ext uri="{BB962C8B-B14F-4D97-AF65-F5344CB8AC3E}">
-        <p14:creationId xmlns:p14="http://schemas.microsoft.com/office/powerpoint/2010/main" val="277171077"/>
+        <p14:creationId xmlns:p14="http://schemas.microsoft.com/office/powerpoint/2010/main" val="3213008061"/>
+      </p:ext>
+    </p:extLst>
+  </p:cSld>
+  <p:clrMapOvr>
+    <a:masterClrMapping/>
+  </p:clrMapOvr>
+</p:sld>
+</file>
+
+<file path=ppt/slides/slide9.xml><?xml version="1.0" encoding="utf-8"?>
+<p:sld xmlns:a="http://schemas.openxmlformats.org/drawingml/2006/main" xmlns:r="http://schemas.openxmlformats.org/officeDocument/2006/relationships" xmlns:p="http://schemas.openxmlformats.org/presentationml/2006/main">
+  <p:cSld>
+    <p:bg>
+      <p:bgPr>
+        <a:solidFill>
+          <a:schemeClr val="bg1"/>
+        </a:solidFill>
+        <a:effectLst/>
+      </p:bgPr>
+    </p:bg>
+    <p:spTree>
+      <p:nvGrpSpPr>
+        <p:cNvPr id="1" name=""/>
+        <p:cNvGrpSpPr/>
+        <p:nvPr/>
+      </p:nvGrpSpPr>
+      <p:grpSpPr>
+        <a:xfrm>
+          <a:off x="0" y="0"/>
+          <a:ext cx="0" cy="0"/>
+          <a:chOff x="0" y="0"/>
+          <a:chExt cx="0" cy="0"/>
+        </a:xfrm>
+      </p:grpSpPr>
+      <p:pic>
+        <p:nvPicPr>
+          <p:cNvPr id="3" name="Picture 2" descr="A screenshot of a computer&#10;&#10;Description automatically generated">
+            <a:extLst>
+              <a:ext uri="{FF2B5EF4-FFF2-40B4-BE49-F238E27FC236}">
+                <a16:creationId xmlns:a16="http://schemas.microsoft.com/office/drawing/2014/main" id="{89699350-527B-FC41-86EC-BF745D652303}"/>
+              </a:ext>
+            </a:extLst>
+          </p:cNvPr>
+          <p:cNvPicPr>
+            <a:picLocks noChangeAspect="1"/>
+          </p:cNvPicPr>
+          <p:nvPr/>
+        </p:nvPicPr>
+        <p:blipFill rotWithShape="1">
+          <a:blip r:embed="rId3"/>
+          <a:srcRect t="26948"/>
+          <a:stretch/>
+        </p:blipFill>
+        <p:spPr>
+          <a:xfrm>
+            <a:off x="20" y="10"/>
+            <a:ext cx="12191980" cy="6857990"/>
+          </a:xfrm>
+          <a:prstGeom prst="rect">
+            <a:avLst/>
+          </a:prstGeom>
+        </p:spPr>
+      </p:pic>
+      <p:sp>
+        <p:nvSpPr>
+          <p:cNvPr id="4" name="Rounded Rectangular Callout 3">
+            <a:extLst>
+              <a:ext uri="{FF2B5EF4-FFF2-40B4-BE49-F238E27FC236}">
+                <a16:creationId xmlns:a16="http://schemas.microsoft.com/office/drawing/2014/main" id="{393FA599-AB15-5B4B-8770-05D3A3990E7A}"/>
+              </a:ext>
+            </a:extLst>
+          </p:cNvPr>
+          <p:cNvSpPr/>
+          <p:nvPr/>
+        </p:nvSpPr>
+        <p:spPr>
+          <a:xfrm>
+            <a:off x="9246499" y="2239093"/>
+            <a:ext cx="2687196" cy="1465002"/>
+          </a:xfrm>
+          <a:prstGeom prst="wedgeRoundRectCallout">
+            <a:avLst>
+              <a:gd name="adj1" fmla="val -74749"/>
+              <a:gd name="adj2" fmla="val 21514"/>
+              <a:gd name="adj3" fmla="val 16667"/>
+            </a:avLst>
+          </a:prstGeom>
+          <a:solidFill>
+            <a:srgbClr val="C00000"/>
+          </a:solidFill>
+          <a:ln>
+            <a:solidFill>
+              <a:srgbClr val="C00000"/>
+            </a:solidFill>
+          </a:ln>
+        </p:spPr>
+        <p:style>
+          <a:lnRef idx="2">
+            <a:schemeClr val="accent1">
+              <a:shade val="50000"/>
+            </a:schemeClr>
+          </a:lnRef>
+          <a:fillRef idx="1">
+            <a:schemeClr val="accent1"/>
+          </a:fillRef>
+          <a:effectRef idx="0">
+            <a:schemeClr val="accent1"/>
+          </a:effectRef>
+          <a:fontRef idx="minor">
+            <a:schemeClr val="lt1"/>
+          </a:fontRef>
+        </p:style>
+        <p:txBody>
+          <a:bodyPr rtlCol="0" anchor="ctr"/>
+          <a:lstStyle/>
+          <a:p>
+            <a:pPr algn="ctr"/>
+            <a:r>
+              <a:rPr lang="en-US" sz="3200" dirty="0"/>
+              <a:t>Result of the R code chunk</a:t>
+            </a:r>
+          </a:p>
+        </p:txBody>
+      </p:sp>
+    </p:spTree>
+    <p:extLst>
+      <p:ext uri="{BB962C8B-B14F-4D97-AF65-F5344CB8AC3E}">
+        <p14:creationId xmlns:p14="http://schemas.microsoft.com/office/powerpoint/2010/main" val="2177016852"/>
       </p:ext>
     </p:extLst>
   </p:cSld>

</xml_diff>